<commit_message>
Final before defending it
</commit_message>
<xml_diff>
--- a/docs/materials/natverk/material_natverk_revision.pptx
+++ b/docs/materials/natverk/material_natverk_revision.pptx
@@ -1658,8 +1658,8 @@
         </p:nvSpPr>
         <p:spPr>
           <a:xfrm>
-            <a:off x="4536000" y="504000"/>
-            <a:ext cx="5904000" cy="6487920"/>
+            <a:off x="4536000" y="503999"/>
+            <a:ext cx="5904000" cy="6870577"/>
           </a:xfrm>
           <a:prstGeom prst="rect">
             <a:avLst/>
@@ -1669,12 +1669,379 @@
           <a:bodyPr lIns="0" tIns="0" rIns="0" bIns="0"/>
           <a:lstStyle/>
           <a:p>
-            <a:r>
-              <a:rPr lang="sv-SE" sz="2000" b="0" strike="noStrike" spc="-1">
+            <a:pPr marL="342900" indent="-342900">
+              <a:buFont typeface="Arial" panose="020B0604020202020204" pitchFamily="34" charset="0"/>
+              <a:buChar char="•"/>
+            </a:pPr>
+            <a:r>
+              <a:rPr lang="sv-SE" sz="2000" b="0" strike="noStrike" spc="-1" dirty="0" smtClean="0">
                 <a:latin typeface="Arial"/>
               </a:rPr>
-              <a:t>(här ska det stå fördjupande text i framtiden)</a:t>
-            </a:r>
+              <a:t>Begrepp</a:t>
+            </a:r>
+            <a:br>
+              <a:rPr lang="sv-SE" sz="2000" b="0" strike="noStrike" spc="-1" dirty="0" smtClean="0">
+                <a:latin typeface="Arial"/>
+              </a:rPr>
+            </a:br>
+            <a:r>
+              <a:rPr lang="sv-SE" sz="2000" b="0" strike="noStrike" spc="-1" dirty="0" smtClean="0">
+                <a:latin typeface="Arial"/>
+              </a:rPr>
+              <a:t>- </a:t>
+            </a:r>
+            <a:r>
+              <a:rPr lang="sv-SE" sz="2000" b="1" strike="noStrike" spc="-1" dirty="0" smtClean="0">
+                <a:latin typeface="Arial"/>
+              </a:rPr>
+              <a:t>nod</a:t>
+            </a:r>
+            <a:r>
+              <a:rPr lang="sv-SE" sz="2000" b="0" strike="noStrike" spc="-1" dirty="0" smtClean="0">
+                <a:latin typeface="Arial"/>
+              </a:rPr>
+              <a:t>	Varje cirkel är en nod</a:t>
+            </a:r>
+            <a:br>
+              <a:rPr lang="sv-SE" sz="2000" b="0" strike="noStrike" spc="-1" dirty="0" smtClean="0">
+                <a:latin typeface="Arial"/>
+              </a:rPr>
+            </a:br>
+            <a:r>
+              <a:rPr lang="sv-SE" sz="2000" b="0" strike="noStrike" spc="-1" dirty="0" smtClean="0">
+                <a:latin typeface="Arial"/>
+              </a:rPr>
+              <a:t>- </a:t>
+            </a:r>
+            <a:r>
+              <a:rPr lang="sv-SE" sz="2000" b="1" strike="noStrike" spc="-1" dirty="0" smtClean="0">
+                <a:latin typeface="Arial"/>
+              </a:rPr>
+              <a:t>kant</a:t>
+            </a:r>
+            <a:r>
+              <a:rPr lang="sv-SE" sz="2000" b="0" strike="noStrike" spc="-1" dirty="0" smtClean="0">
+                <a:latin typeface="Arial"/>
+              </a:rPr>
+              <a:t>	Ett streck mellan cirklar/noder</a:t>
+            </a:r>
+            <a:br>
+              <a:rPr lang="sv-SE" sz="2000" b="0" strike="noStrike" spc="-1" dirty="0" smtClean="0">
+                <a:latin typeface="Arial"/>
+              </a:rPr>
+            </a:br>
+            <a:r>
+              <a:rPr lang="sv-SE" sz="2000" b="0" strike="noStrike" spc="-1" dirty="0" smtClean="0">
+                <a:latin typeface="Arial"/>
+              </a:rPr>
+              <a:t>- </a:t>
+            </a:r>
+            <a:r>
+              <a:rPr lang="sv-SE" sz="2000" b="1" strike="noStrike" spc="-1" dirty="0" smtClean="0">
+                <a:latin typeface="Arial"/>
+              </a:rPr>
+              <a:t>grad</a:t>
+            </a:r>
+            <a:r>
+              <a:rPr lang="sv-SE" sz="2000" b="0" strike="noStrike" spc="-1" dirty="0" smtClean="0">
+                <a:latin typeface="Arial"/>
+              </a:rPr>
+              <a:t>	Graden för en nod är det antal			kanter som går till den.</a:t>
+            </a:r>
+            <a:br>
+              <a:rPr lang="sv-SE" sz="2000" b="0" strike="noStrike" spc="-1" dirty="0" smtClean="0">
+                <a:latin typeface="Arial"/>
+              </a:rPr>
+            </a:br>
+            <a:r>
+              <a:rPr lang="sv-SE" sz="2000" b="0" strike="noStrike" spc="-1" dirty="0" smtClean="0">
+                <a:latin typeface="Arial"/>
+              </a:rPr>
+              <a:t>- </a:t>
+            </a:r>
+            <a:r>
+              <a:rPr lang="sv-SE" sz="2000" b="1" strike="noStrike" spc="-1" dirty="0" smtClean="0">
+                <a:latin typeface="Arial"/>
+              </a:rPr>
+              <a:t>centralitet</a:t>
+            </a:r>
+            <a:r>
+              <a:rPr lang="sv-SE" sz="2000" b="0" strike="noStrike" spc="-1" dirty="0" smtClean="0">
+                <a:latin typeface="Arial"/>
+              </a:rPr>
+              <a:t>	Det finns olika typer av centralitet.</a:t>
+            </a:r>
+            <a:br>
+              <a:rPr lang="sv-SE" sz="2000" b="0" strike="noStrike" spc="-1" dirty="0" smtClean="0">
+                <a:latin typeface="Arial"/>
+              </a:rPr>
+            </a:br>
+            <a:r>
+              <a:rPr lang="sv-SE" sz="2000" b="0" strike="noStrike" spc="-1" dirty="0" smtClean="0">
+                <a:latin typeface="Arial"/>
+              </a:rPr>
+              <a:t>		Närhetscentralitet är troligen den 		vanligaste. Där använder man sig 		av kortaste vägen mellan noder</a:t>
+            </a:r>
+            <a:r>
+              <a:rPr lang="sv-SE" sz="2000" spc="-1" dirty="0" smtClean="0">
+                <a:latin typeface="Arial"/>
+              </a:rPr>
+              <a:t>, för 		att bestämma vilken nod som har 		det kortaste genomsnittliga 			avståndet till de andra noderna. 			Denna nod är den mest 				(närhets-)centrala noden.</a:t>
+            </a:r>
+          </a:p>
+          <a:p>
+            <a:pPr marL="342900" indent="-342900">
+              <a:buFont typeface="Arial" panose="020B0604020202020204" pitchFamily="34" charset="0"/>
+              <a:buChar char="•"/>
+            </a:pPr>
+            <a:endParaRPr lang="sv-SE" sz="2000" spc="-1" dirty="0">
+              <a:latin typeface="Arial"/>
+            </a:endParaRPr>
+          </a:p>
+          <a:p>
+            <a:pPr marL="342900" indent="-342900">
+              <a:buFont typeface="Arial" panose="020B0604020202020204" pitchFamily="34" charset="0"/>
+              <a:buChar char="•"/>
+            </a:pPr>
+            <a:r>
+              <a:rPr lang="sv-SE" sz="2000" b="1" strike="noStrike" spc="-1" dirty="0" smtClean="0">
+                <a:latin typeface="Arial"/>
+              </a:rPr>
+              <a:t>Olika sätt att skapa nätverk</a:t>
+            </a:r>
+            <a:br>
+              <a:rPr lang="sv-SE" sz="2000" b="1" strike="noStrike" spc="-1" dirty="0" smtClean="0">
+                <a:latin typeface="Arial"/>
+              </a:rPr>
+            </a:br>
+            <a:r>
+              <a:rPr lang="sv-SE" sz="2000" strike="noStrike" spc="-1" dirty="0" smtClean="0">
+                <a:latin typeface="Arial"/>
+              </a:rPr>
+              <a:t>Noder kan kopplas till andra noder </a:t>
+            </a:r>
+            <a:r>
+              <a:rPr lang="sv-SE" sz="2000" spc="-1" dirty="0" smtClean="0">
+                <a:latin typeface="Arial"/>
+              </a:rPr>
+              <a:t>av samma typ, Facebook kopplar personer till andra personer. Men Facebook kopplar också personer till grupper, vilket gör att personerna inte är direkt knutna till varandra. Detta är två olika sätt. Och i nästa </a:t>
+            </a:r>
+            <a:r>
+              <a:rPr lang="sv-SE" sz="2000" spc="-1" dirty="0" err="1" smtClean="0">
+                <a:latin typeface="Arial"/>
+              </a:rPr>
+              <a:t>slide</a:t>
+            </a:r>
+            <a:r>
+              <a:rPr lang="sv-SE" sz="2000" spc="-1" dirty="0" smtClean="0">
+                <a:latin typeface="Arial"/>
+              </a:rPr>
+              <a:t> finns ett annat sätt att visa nätverk på.</a:t>
+            </a:r>
+            <a:endParaRPr lang="sv-SE" sz="2000" b="1" strike="noStrike" spc="-1" dirty="0" smtClean="0">
+              <a:latin typeface="Arial"/>
+            </a:endParaRPr>
+          </a:p>
+        </p:txBody>
+      </p:sp>
+      <p:sp>
+        <p:nvSpPr>
+          <p:cNvPr id="5" name="PlaceHolder 2"/>
+          <p:cNvSpPr txBox="1">
+            <a:spLocks/>
+          </p:cNvSpPr>
+          <p:nvPr/>
+        </p:nvSpPr>
+        <p:spPr>
+          <a:xfrm>
+            <a:off x="401408" y="4453247"/>
+            <a:ext cx="4313096" cy="2895168"/>
+          </a:xfrm>
+          <a:prstGeom prst="rect">
+            <a:avLst/>
+          </a:prstGeom>
+        </p:spPr>
+        <p:txBody>
+          <a:bodyPr lIns="0" tIns="0" rIns="0" bIns="0"/>
+          <a:lstStyle>
+            <a:lvl1pPr marL="0" algn="l" defTabSz="914400" rtl="0" eaLnBrk="1" latinLnBrk="0" hangingPunct="1">
+              <a:defRPr sz="1200" kern="1200">
+                <a:solidFill>
+                  <a:schemeClr val="tx1"/>
+                </a:solidFill>
+                <a:latin typeface="+mn-lt"/>
+                <a:ea typeface="+mn-ea"/>
+                <a:cs typeface="+mn-cs"/>
+              </a:defRPr>
+            </a:lvl1pPr>
+            <a:lvl2pPr marL="457200" algn="l" defTabSz="914400" rtl="0" eaLnBrk="1" latinLnBrk="0" hangingPunct="1">
+              <a:defRPr sz="1200" kern="1200">
+                <a:solidFill>
+                  <a:schemeClr val="tx1"/>
+                </a:solidFill>
+                <a:latin typeface="+mn-lt"/>
+                <a:ea typeface="+mn-ea"/>
+                <a:cs typeface="+mn-cs"/>
+              </a:defRPr>
+            </a:lvl2pPr>
+            <a:lvl3pPr marL="914400" algn="l" defTabSz="914400" rtl="0" eaLnBrk="1" latinLnBrk="0" hangingPunct="1">
+              <a:defRPr sz="1200" kern="1200">
+                <a:solidFill>
+                  <a:schemeClr val="tx1"/>
+                </a:solidFill>
+                <a:latin typeface="+mn-lt"/>
+                <a:ea typeface="+mn-ea"/>
+                <a:cs typeface="+mn-cs"/>
+              </a:defRPr>
+            </a:lvl3pPr>
+            <a:lvl4pPr marL="1371600" algn="l" defTabSz="914400" rtl="0" eaLnBrk="1" latinLnBrk="0" hangingPunct="1">
+              <a:defRPr sz="1200" kern="1200">
+                <a:solidFill>
+                  <a:schemeClr val="tx1"/>
+                </a:solidFill>
+                <a:latin typeface="+mn-lt"/>
+                <a:ea typeface="+mn-ea"/>
+                <a:cs typeface="+mn-cs"/>
+              </a:defRPr>
+            </a:lvl4pPr>
+            <a:lvl5pPr marL="1828800" algn="l" defTabSz="914400" rtl="0" eaLnBrk="1" latinLnBrk="0" hangingPunct="1">
+              <a:defRPr sz="1200" kern="1200">
+                <a:solidFill>
+                  <a:schemeClr val="tx1"/>
+                </a:solidFill>
+                <a:latin typeface="+mn-lt"/>
+                <a:ea typeface="+mn-ea"/>
+                <a:cs typeface="+mn-cs"/>
+              </a:defRPr>
+            </a:lvl5pPr>
+            <a:lvl6pPr marL="2286000" algn="l" defTabSz="914400" rtl="0" eaLnBrk="1" latinLnBrk="0" hangingPunct="1">
+              <a:defRPr sz="1200" kern="1200">
+                <a:solidFill>
+                  <a:schemeClr val="tx1"/>
+                </a:solidFill>
+                <a:latin typeface="+mn-lt"/>
+                <a:ea typeface="+mn-ea"/>
+                <a:cs typeface="+mn-cs"/>
+              </a:defRPr>
+            </a:lvl6pPr>
+            <a:lvl7pPr marL="2743200" algn="l" defTabSz="914400" rtl="0" eaLnBrk="1" latinLnBrk="0" hangingPunct="1">
+              <a:defRPr sz="1200" kern="1200">
+                <a:solidFill>
+                  <a:schemeClr val="tx1"/>
+                </a:solidFill>
+                <a:latin typeface="+mn-lt"/>
+                <a:ea typeface="+mn-ea"/>
+                <a:cs typeface="+mn-cs"/>
+              </a:defRPr>
+            </a:lvl7pPr>
+            <a:lvl8pPr marL="3200400" algn="l" defTabSz="914400" rtl="0" eaLnBrk="1" latinLnBrk="0" hangingPunct="1">
+              <a:defRPr sz="1200" kern="1200">
+                <a:solidFill>
+                  <a:schemeClr val="tx1"/>
+                </a:solidFill>
+                <a:latin typeface="+mn-lt"/>
+                <a:ea typeface="+mn-ea"/>
+                <a:cs typeface="+mn-cs"/>
+              </a:defRPr>
+            </a:lvl8pPr>
+            <a:lvl9pPr marL="3657600" algn="l" defTabSz="914400" rtl="0" eaLnBrk="1" latinLnBrk="0" hangingPunct="1">
+              <a:defRPr sz="1200" kern="1200">
+                <a:solidFill>
+                  <a:schemeClr val="tx1"/>
+                </a:solidFill>
+                <a:latin typeface="+mn-lt"/>
+                <a:ea typeface="+mn-ea"/>
+                <a:cs typeface="+mn-cs"/>
+              </a:defRPr>
+            </a:lvl9pPr>
+          </a:lstStyle>
+          <a:p>
+            <a:endParaRPr lang="sv-SE" sz="2000" spc="-1" dirty="0">
+              <a:latin typeface="Arial"/>
+            </a:endParaRPr>
+          </a:p>
+        </p:txBody>
+      </p:sp>
+      <p:sp>
+        <p:nvSpPr>
+          <p:cNvPr id="3" name="Rektangel 2"/>
+          <p:cNvSpPr/>
+          <p:nvPr/>
+        </p:nvSpPr>
+        <p:spPr>
+          <a:xfrm>
+            <a:off x="167657" y="3843369"/>
+            <a:ext cx="4224956" cy="2585323"/>
+          </a:xfrm>
+          <a:prstGeom prst="rect">
+            <a:avLst/>
+          </a:prstGeom>
+        </p:spPr>
+        <p:txBody>
+          <a:bodyPr wrap="square">
+            <a:spAutoFit/>
+          </a:bodyPr>
+          <a:lstStyle/>
+          <a:p>
+            <a:pPr marL="342900" indent="-342900">
+              <a:buFont typeface="Arial" panose="020B0604020202020204" pitchFamily="34" charset="0"/>
+              <a:buChar char="•"/>
+            </a:pPr>
+            <a:r>
+              <a:rPr lang="sv-SE" b="1" spc="-1" dirty="0"/>
+              <a:t>Varför kan vissa noder vara extra viktiga?</a:t>
+            </a:r>
+            <a:br>
+              <a:rPr lang="sv-SE" b="1" spc="-1" dirty="0"/>
+            </a:br>
+            <a:r>
+              <a:rPr lang="sv-SE" spc="-1" dirty="0"/>
+              <a:t>Om t.ex. den </a:t>
+            </a:r>
+            <a:r>
+              <a:rPr lang="sv-SE" spc="-1" dirty="0" smtClean="0"/>
+              <a:t>noden som är mest </a:t>
+            </a:r>
+            <a:r>
+              <a:rPr lang="sv-SE" spc="-1" dirty="0"/>
+              <a:t>(närhets-</a:t>
+            </a:r>
+            <a:r>
+              <a:rPr lang="sv-SE" spc="-1" dirty="0" smtClean="0"/>
+              <a:t>)central </a:t>
+            </a:r>
+            <a:r>
+              <a:rPr lang="sv-SE" spc="-1" dirty="0"/>
+              <a:t>skulle </a:t>
+            </a:r>
+            <a:r>
+              <a:rPr lang="sv-SE" spc="-1" dirty="0" smtClean="0"/>
+              <a:t>försvinna, </a:t>
+            </a:r>
+            <a:br>
+              <a:rPr lang="sv-SE" spc="-1" dirty="0" smtClean="0"/>
+            </a:br>
+            <a:r>
+              <a:rPr lang="sv-SE" spc="-1" dirty="0" smtClean="0"/>
+              <a:t>så </a:t>
+            </a:r>
+            <a:r>
+              <a:rPr lang="sv-SE" spc="-1" dirty="0"/>
+              <a:t>skulle det generella avståndet mellan de andra noderna i grafen öka. </a:t>
+            </a:r>
+            <a:r>
+              <a:rPr lang="sv-SE" spc="-1" dirty="0" smtClean="0"/>
+              <a:t>Om t.ex. din TV skulle gå sönder, så ökar det avståndet mellan dig och din </a:t>
+            </a:r>
+            <a:r>
+              <a:rPr lang="sv-SE" spc="-1" dirty="0" err="1" smtClean="0"/>
+              <a:t>spelkonsoll</a:t>
+            </a:r>
+            <a:r>
+              <a:rPr lang="sv-SE" spc="-1" dirty="0" smtClean="0"/>
+              <a:t>.</a:t>
+            </a:r>
+            <a:endParaRPr lang="sv-SE" b="1" spc="-1" dirty="0"/>
           </a:p>
         </p:txBody>
       </p:sp>
@@ -1705,26 +2072,6 @@
       </p:grpSpPr>
       <p:sp>
         <p:nvSpPr>
-          <p:cNvPr id="236" name="PlaceHolder 1"/>
-          <p:cNvSpPr>
-            <a:spLocks noGrp="1" noRot="1" noChangeAspect="1"/>
-          </p:cNvSpPr>
-          <p:nvPr>
-            <p:ph type="sldImg"/>
-          </p:nvPr>
-        </p:nvSpPr>
-        <p:spPr>
-          <a:xfrm>
-            <a:off x="757238" y="477838"/>
-            <a:ext cx="3778250" cy="2833687"/>
-          </a:xfrm>
-          <a:prstGeom prst="rect">
-            <a:avLst/>
-          </a:prstGeom>
-        </p:spPr>
-      </p:sp>
-      <p:sp>
-        <p:nvSpPr>
           <p:cNvPr id="237" name="PlaceHolder 2"/>
           <p:cNvSpPr>
             <a:spLocks noGrp="1"/>
@@ -1746,12 +2093,226 @@
           <a:bodyPr lIns="0" tIns="0" rIns="0" bIns="0"/>
           <a:lstStyle/>
           <a:p>
-            <a:r>
-              <a:rPr lang="sv-SE" sz="2000" b="0" strike="noStrike" spc="-1">
+            <a:pPr marL="342900" indent="-342900">
+              <a:buFont typeface="Arial" panose="020B0604020202020204" pitchFamily="34" charset="0"/>
+              <a:buChar char="•"/>
+            </a:pPr>
+            <a:r>
+              <a:rPr lang="sv-SE" sz="1600" b="1" spc="-1" dirty="0" smtClean="0">
                 <a:latin typeface="Arial"/>
               </a:rPr>
-              <a:t>(här ska det stå fördjupande text i framtiden)</a:t>
-            </a:r>
+              <a:t>Osorterad vs. sorterad data (se bilder)</a:t>
+            </a:r>
+            <a:r>
+              <a:rPr lang="sv-SE" sz="2000" b="1" spc="-1" dirty="0">
+                <a:latin typeface="Arial"/>
+              </a:rPr>
+              <a:t/>
+            </a:r>
+            <a:br>
+              <a:rPr lang="sv-SE" sz="2000" b="1" spc="-1" dirty="0">
+                <a:latin typeface="Arial"/>
+              </a:rPr>
+            </a:br>
+            <a:r>
+              <a:rPr lang="sv-SE" sz="1600" spc="-1" dirty="0" smtClean="0">
+                <a:latin typeface="Arial"/>
+              </a:rPr>
+              <a:t>Här visas ett nätverk i tabellform istället. Rader och kolumner är noder (cirklarna) och ett ifyllda rutor är samma sak som ett (streck). Tomma rutor betyder alltså inget streck.</a:t>
+            </a:r>
+            <a:r>
+              <a:rPr lang="sv-SE" sz="1600" spc="-1" dirty="0">
+                <a:latin typeface="Arial"/>
+              </a:rPr>
+              <a:t/>
+            </a:r>
+            <a:br>
+              <a:rPr lang="sv-SE" sz="1600" spc="-1" dirty="0">
+                <a:latin typeface="Arial"/>
+              </a:rPr>
+            </a:br>
+            <a:r>
+              <a:rPr lang="sv-SE" sz="1600" spc="-1" dirty="0">
+                <a:latin typeface="Arial"/>
+              </a:rPr>
+              <a:t>	</a:t>
+            </a:r>
+            <a:r>
+              <a:rPr lang="sv-SE" sz="1600" spc="-1" dirty="0" smtClean="0">
+                <a:latin typeface="Arial"/>
+              </a:rPr>
+              <a:t>Den översta bilden är denna data osorterad, man har samlat in det slumpmässigt. Sedan har man låtit en dator sortera </a:t>
+            </a:r>
+            <a:r>
+              <a:rPr lang="sv-SE" sz="1600" spc="-1" dirty="0" err="1" smtClean="0">
+                <a:latin typeface="Arial"/>
+              </a:rPr>
+              <a:t>datan</a:t>
+            </a:r>
+            <a:r>
+              <a:rPr lang="sv-SE" sz="1600" spc="-1" dirty="0">
+                <a:latin typeface="Arial"/>
+              </a:rPr>
+              <a:t> </a:t>
+            </a:r>
+            <a:r>
+              <a:rPr lang="sv-SE" sz="1600" spc="-1" dirty="0" smtClean="0">
+                <a:latin typeface="Arial"/>
+              </a:rPr>
+              <a:t>och häftigt nog har det skapats ett tydligt mönster.</a:t>
+            </a:r>
+          </a:p>
+          <a:p>
+            <a:pPr marL="342900" indent="-342900">
+              <a:buFont typeface="Arial" panose="020B0604020202020204" pitchFamily="34" charset="0"/>
+              <a:buChar char="•"/>
+            </a:pPr>
+            <a:r>
+              <a:rPr lang="sv-SE" sz="1600" b="1" spc="-1" dirty="0" err="1" smtClean="0">
+                <a:latin typeface="Arial"/>
+              </a:rPr>
+              <a:t>Clay</a:t>
+            </a:r>
+            <a:r>
+              <a:rPr lang="sv-SE" sz="1600" b="1" spc="-1" dirty="0" smtClean="0">
+                <a:latin typeface="Arial"/>
+              </a:rPr>
+              <a:t> institutet […]</a:t>
+            </a:r>
+            <a:r>
+              <a:rPr lang="sv-SE" sz="2000" spc="-1" dirty="0">
+                <a:latin typeface="Arial"/>
+              </a:rPr>
+              <a:t/>
+            </a:r>
+            <a:br>
+              <a:rPr lang="sv-SE" sz="2000" spc="-1" dirty="0">
+                <a:latin typeface="Arial"/>
+              </a:rPr>
+            </a:br>
+            <a:r>
+              <a:rPr lang="sv-SE" sz="1600" spc="-1" dirty="0" err="1" smtClean="0">
+                <a:latin typeface="Arial"/>
+              </a:rPr>
+              <a:t>Clay</a:t>
+            </a:r>
+            <a:r>
+              <a:rPr lang="sv-SE" sz="1600" spc="-1" dirty="0" smtClean="0">
+                <a:latin typeface="Arial"/>
+              </a:rPr>
+              <a:t> institutet har skapat en lista på några olika problem som de delar ut stora summor pengar till om man löser. Anledningen till detta är att världen kommer att förändras markant ifall någon lyckas lösa ett sådant här problem. Ett problem innebär att hitta ett sätt att göra vissa specifika långsamma uträkningar snabbare.</a:t>
+            </a:r>
+          </a:p>
+          <a:p>
+            <a:pPr marL="342900" indent="-342900">
+              <a:buFont typeface="Arial" panose="020B0604020202020204" pitchFamily="34" charset="0"/>
+              <a:buChar char="•"/>
+            </a:pPr>
+            <a:r>
+              <a:rPr lang="sv-SE" sz="1600" b="1" spc="-1" dirty="0" smtClean="0">
+                <a:latin typeface="Arial"/>
+              </a:rPr>
+              <a:t>Traditionella algoritmer […]</a:t>
+            </a:r>
+            <a:r>
+              <a:rPr lang="sv-SE" sz="1600" spc="-1" dirty="0" smtClean="0">
+                <a:latin typeface="Arial"/>
+              </a:rPr>
+              <a:t/>
+            </a:r>
+            <a:br>
+              <a:rPr lang="sv-SE" sz="1600" spc="-1" dirty="0" smtClean="0">
+                <a:latin typeface="Arial"/>
+              </a:rPr>
+            </a:br>
+            <a:r>
+              <a:rPr lang="sv-SE" sz="1600" spc="-1" dirty="0" smtClean="0">
+                <a:latin typeface="Arial"/>
+              </a:rPr>
+              <a:t>En algoritm är t.ex. en lista av steg som krävs för att slå in en viss typ av uträkning på en miniräknare. Du kanske inte skulle ha någon aning om hur man ska göra, men om du får se algoritmen så förstår du hur det funkar.</a:t>
+            </a:r>
+            <a:br>
+              <a:rPr lang="sv-SE" sz="1600" spc="-1" dirty="0" smtClean="0">
+                <a:latin typeface="Arial"/>
+              </a:rPr>
+            </a:br>
+            <a:r>
+              <a:rPr lang="sv-SE" sz="1600" spc="-1" dirty="0" smtClean="0">
+                <a:latin typeface="Arial"/>
+              </a:rPr>
+              <a:t>	Moderna algoritmer, t.ex. hur Youtube avgör vilka videor just du ska bli rekommenderad, är mer avancerade. De anpassar sig själva baserat på användande på Youtube och inte ens de som skrivit programmet från början kan längre berätta varför algoritmen har valt ut just de videor som du får rekommenderat. </a:t>
+            </a:r>
+          </a:p>
+        </p:txBody>
+      </p:sp>
+      <p:sp>
+        <p:nvSpPr>
+          <p:cNvPr id="5" name="PlaceHolder 1"/>
+          <p:cNvSpPr>
+            <a:spLocks noGrp="1" noRot="1" noChangeAspect="1"/>
+          </p:cNvSpPr>
+          <p:nvPr>
+            <p:ph type="sldImg"/>
+          </p:nvPr>
+        </p:nvSpPr>
+        <p:spPr>
+          <a:xfrm>
+            <a:off x="757238" y="608013"/>
+            <a:ext cx="3778250" cy="2833687"/>
+          </a:xfrm>
+          <a:prstGeom prst="rect">
+            <a:avLst/>
+          </a:prstGeom>
+        </p:spPr>
+      </p:sp>
+      <p:sp>
+        <p:nvSpPr>
+          <p:cNvPr id="2" name="Rektangel 1"/>
+          <p:cNvSpPr/>
+          <p:nvPr/>
+        </p:nvSpPr>
+        <p:spPr>
+          <a:xfrm>
+            <a:off x="0" y="4346540"/>
+            <a:ext cx="4827180" cy="2800767"/>
+          </a:xfrm>
+          <a:prstGeom prst="rect">
+            <a:avLst/>
+          </a:prstGeom>
+        </p:spPr>
+        <p:txBody>
+          <a:bodyPr wrap="square">
+            <a:spAutoFit/>
+          </a:bodyPr>
+          <a:lstStyle/>
+          <a:p>
+            <a:pPr marL="342900" indent="-342900">
+              <a:buFont typeface="Arial" panose="020B0604020202020204" pitchFamily="34" charset="0"/>
+              <a:buChar char="•"/>
+            </a:pPr>
+            <a:r>
+              <a:rPr lang="sv-SE" sz="1600" b="1" spc="-1" dirty="0"/>
+              <a:t>Datainsamling och anonymitet (</a:t>
+            </a:r>
+            <a:r>
+              <a:rPr lang="sv-SE" sz="1600" b="1" spc="-1" dirty="0" smtClean="0"/>
+              <a:t>GDPR)</a:t>
+            </a:r>
+            <a:br>
+              <a:rPr lang="sv-SE" sz="1600" b="1" spc="-1" dirty="0" smtClean="0"/>
+            </a:br>
+            <a:r>
+              <a:rPr lang="sv-SE" sz="1600" spc="-1" dirty="0" smtClean="0"/>
+              <a:t>Youtube, Google, Apple, Facebook m.fl. samlar in information om dig. I huvudsak är det information som hjälper deras algoritmer förbättra din upplevelse.</a:t>
+            </a:r>
+            <a:br>
+              <a:rPr lang="sv-SE" sz="1600" spc="-1" dirty="0" smtClean="0"/>
+            </a:br>
+            <a:r>
+              <a:rPr lang="sv-SE" sz="1600" spc="-1" dirty="0" smtClean="0"/>
+              <a:t>	Men för att förhindra de viktigaste delarna av våra liv från att beslutas enbart av  algoritmer, så står det i den nya personuppgiftslagen (GDPR) att alla har ”rätt till en förklaring” till varför ett visst beslut har fattats.</a:t>
+            </a:r>
+            <a:endParaRPr lang="sv-SE" sz="1600" spc="-1" dirty="0"/>
           </a:p>
         </p:txBody>
       </p:sp>
@@ -1792,8 +2353,8 @@
         </p:nvSpPr>
         <p:spPr>
           <a:xfrm>
-            <a:off x="720725" y="477838"/>
-            <a:ext cx="3778250" cy="2833687"/>
+            <a:off x="720725" y="488950"/>
+            <a:ext cx="3778250" cy="2833688"/>
           </a:xfrm>
           <a:prstGeom prst="rect">
             <a:avLst/>
@@ -1823,12 +2384,156 @@
           <a:bodyPr lIns="0" tIns="0" rIns="0" bIns="0"/>
           <a:lstStyle/>
           <a:p>
-            <a:r>
-              <a:rPr lang="sv-SE" sz="2000" b="0" strike="noStrike" spc="-1">
+            <a:pPr marL="342900" indent="-342900">
+              <a:buFont typeface="Arial" panose="020B0604020202020204" pitchFamily="34" charset="0"/>
+              <a:buChar char="•"/>
+            </a:pPr>
+            <a:r>
+              <a:rPr lang="sv-SE" sz="2000" b="1" strike="noStrike" spc="-1" dirty="0" smtClean="0">
                 <a:latin typeface="Arial"/>
               </a:rPr>
-              <a:t>(här ska det stå fördjupande text i framtiden)</a:t>
-            </a:r>
+              <a:t>Positivt </a:t>
+            </a:r>
+            <a:r>
+              <a:rPr lang="sv-SE" sz="2000" b="1" spc="-1" dirty="0"/>
+              <a:t>och </a:t>
+            </a:r>
+            <a:r>
+              <a:rPr lang="sv-SE" sz="2000" b="1" spc="-1" dirty="0" smtClean="0"/>
+              <a:t>negativt</a:t>
+            </a:r>
+            <a:r>
+              <a:rPr lang="sv-SE" sz="2000" spc="-1" dirty="0" smtClean="0"/>
+              <a:t/>
+            </a:r>
+            <a:br>
+              <a:rPr lang="sv-SE" sz="2000" spc="-1" dirty="0" smtClean="0"/>
+            </a:br>
+            <a:r>
+              <a:rPr lang="sv-SE" sz="2000" spc="-1" dirty="0" smtClean="0"/>
+              <a:t>Låt gärna eleverna skapa en lista på tavlan med positiva och negativa aspekter av nätverk som de samlat på sig under dagen.</a:t>
+            </a:r>
+            <a:br>
+              <a:rPr lang="sv-SE" sz="2000" spc="-1" dirty="0" smtClean="0"/>
+            </a:br>
+            <a:endParaRPr lang="sv-SE" sz="2000" spc="-1" dirty="0" smtClean="0"/>
+          </a:p>
+          <a:p>
+            <a:pPr marL="342900" indent="-342900">
+              <a:buFont typeface="Arial" panose="020B0604020202020204" pitchFamily="34" charset="0"/>
+              <a:buChar char="•"/>
+            </a:pPr>
+            <a:r>
+              <a:rPr lang="sv-SE" sz="2000" b="1" spc="-1" dirty="0" smtClean="0"/>
+              <a:t>Vi lämnar hela tiden digitala fotspår, som får betydelse</a:t>
+            </a:r>
+            <a:r>
+              <a:rPr lang="sv-SE" sz="2000" spc="-1" dirty="0" smtClean="0"/>
+              <a:t/>
+            </a:r>
+            <a:br>
+              <a:rPr lang="sv-SE" sz="2000" spc="-1" dirty="0" smtClean="0"/>
+            </a:br>
+            <a:r>
+              <a:rPr lang="sv-SE" sz="2000" i="1" spc="-1" dirty="0" smtClean="0"/>
+              <a:t>Diskutera</a:t>
+            </a:r>
+            <a:r>
+              <a:rPr lang="sv-SE" sz="2000" spc="-1" dirty="0" smtClean="0"/>
+              <a:t/>
+            </a:r>
+            <a:br>
+              <a:rPr lang="sv-SE" sz="2000" spc="-1" dirty="0" smtClean="0"/>
+            </a:br>
+            <a:endParaRPr lang="sv-SE" sz="2000" spc="-1" dirty="0" smtClean="0"/>
+          </a:p>
+          <a:p>
+            <a:pPr marL="342900" indent="-342900">
+              <a:buFont typeface="Arial" panose="020B0604020202020204" pitchFamily="34" charset="0"/>
+              <a:buChar char="•"/>
+            </a:pPr>
+            <a:r>
+              <a:rPr lang="sv-SE" sz="2000" b="1" spc="-1" dirty="0" smtClean="0"/>
+              <a:t>Socialt ansvar, matematik i samhället, normer och värderingar</a:t>
+            </a:r>
+            <a:br>
+              <a:rPr lang="sv-SE" sz="2000" b="1" spc="-1" dirty="0" smtClean="0"/>
+            </a:br>
+            <a:r>
+              <a:rPr lang="sv-SE" sz="2000" i="1" spc="-1" dirty="0"/>
+              <a:t>Diskutera</a:t>
+            </a:r>
+            <a:r>
+              <a:rPr lang="sv-SE" sz="2000" spc="-1" dirty="0" smtClean="0"/>
+              <a:t/>
+            </a:r>
+            <a:br>
+              <a:rPr lang="sv-SE" sz="2000" spc="-1" dirty="0" smtClean="0"/>
+            </a:br>
+            <a:endParaRPr lang="sv-SE" sz="2000" spc="-1" dirty="0" smtClean="0"/>
+          </a:p>
+          <a:p>
+            <a:pPr marL="342900" indent="-342900">
+              <a:buFont typeface="Arial" panose="020B0604020202020204" pitchFamily="34" charset="0"/>
+              <a:buChar char="•"/>
+            </a:pPr>
+            <a:r>
+              <a:rPr lang="sv-SE" sz="2000" b="1" spc="-1" dirty="0" smtClean="0"/>
+              <a:t>Tekniker att analyser nätverk används i cancerforskning m.m</a:t>
+            </a:r>
+            <a:r>
+              <a:rPr lang="sv-SE" sz="2000" spc="-1" dirty="0" smtClean="0"/>
+              <a:t>.</a:t>
+            </a:r>
+            <a:br>
+              <a:rPr lang="sv-SE" sz="2000" spc="-1" dirty="0" smtClean="0"/>
+            </a:br>
+            <a:r>
+              <a:rPr lang="sv-SE" sz="2000" i="1" spc="-1" dirty="0"/>
+              <a:t>Diskutera</a:t>
+            </a:r>
+            <a:r>
+              <a:rPr lang="sv-SE" sz="2000" spc="-1" dirty="0" smtClean="0"/>
+              <a:t/>
+            </a:r>
+            <a:br>
+              <a:rPr lang="sv-SE" sz="2000" spc="-1" dirty="0" smtClean="0"/>
+            </a:br>
+            <a:endParaRPr lang="sv-SE" sz="2000" spc="-1" dirty="0" smtClean="0"/>
+          </a:p>
+          <a:p>
+            <a:pPr marL="342900" indent="-342900">
+              <a:buFont typeface="Arial" panose="020B0604020202020204" pitchFamily="34" charset="0"/>
+              <a:buChar char="•"/>
+            </a:pPr>
+            <a:r>
+              <a:rPr lang="sv-SE" sz="2000" b="1" spc="-1" dirty="0" smtClean="0"/>
+              <a:t>Nätverk kan se väldigt olika ut, </a:t>
+            </a:r>
+            <a:br>
+              <a:rPr lang="sv-SE" sz="2000" b="1" spc="-1" dirty="0" smtClean="0"/>
+            </a:br>
+            <a:r>
+              <a:rPr lang="sv-SE" sz="2000" b="1" spc="-1" dirty="0" smtClean="0"/>
+              <a:t>dra slutsatser och </a:t>
+            </a:r>
+            <a:r>
+              <a:rPr lang="sv-SE" sz="2000" b="1" spc="-1" smtClean="0"/>
+              <a:t>hitta mönster</a:t>
+            </a:r>
+            <a:br>
+              <a:rPr lang="sv-SE" sz="2000" b="1" spc="-1" smtClean="0"/>
+            </a:br>
+            <a:r>
+              <a:rPr lang="sv-SE" sz="2000" i="1" spc="-1"/>
+              <a:t>Diskutera</a:t>
+            </a:r>
+            <a:endParaRPr lang="sv-SE" sz="2000" b="1" spc="-1" dirty="0" smtClean="0"/>
+          </a:p>
+          <a:p>
+            <a:endParaRPr lang="sv-SE" sz="2000" b="0" strike="noStrike" spc="-1" dirty="0" smtClean="0">
+              <a:latin typeface="Arial"/>
+            </a:endParaRPr>
           </a:p>
         </p:txBody>
       </p:sp>
@@ -1901,7 +2606,7 @@
           <a:lstStyle/>
           <a:p>
             <a:r>
-              <a:rPr lang="sv-SE" sz="2000" b="0" strike="noStrike" spc="-1">
+              <a:rPr lang="sv-SE" sz="2000" b="0" strike="noStrike" spc="-1" dirty="0">
                 <a:latin typeface="Arial"/>
               </a:rPr>
               <a:t>Denna lektion baserades på en föreläsning som hölls under Kleindagarna. Sedan dess har den reviderats som en del av ett examensarbete på Chalmers. Vissa referenser är från Kleindagarna och har tillkommit senare. </a:t>
@@ -18902,7 +19607,7 @@
               <a:buChar char=""/>
             </a:pPr>
             <a:r>
-              <a:rPr lang="sv-SE" sz="1600" b="0" strike="noStrike" spc="-1">
+              <a:rPr lang="sv-SE" sz="1600" b="0" strike="noStrike" spc="-1" dirty="0">
                 <a:solidFill>
                   <a:srgbClr val="000000"/>
                 </a:solidFill>
@@ -18911,7 +19616,7 @@
               </a:rPr>
               <a:t> Osorterad vs. sorterad data (se bilder)</a:t>
             </a:r>
-            <a:endParaRPr lang="sv-SE" sz="1600" b="0" strike="noStrike" spc="-1">
+            <a:endParaRPr lang="sv-SE" sz="1600" b="0" strike="noStrike" spc="-1" dirty="0">
               <a:latin typeface="Arial"/>
             </a:endParaRPr>
           </a:p>
@@ -18921,7 +19626,7 @@
                 <a:spcPts val="1755"/>
               </a:lnSpc>
             </a:pPr>
-            <a:endParaRPr lang="sv-SE" sz="1600" b="0" strike="noStrike" spc="-1">
+            <a:endParaRPr lang="sv-SE" sz="1600" b="0" strike="noStrike" spc="-1" dirty="0">
               <a:latin typeface="Arial"/>
             </a:endParaRPr>
           </a:p>
@@ -18931,7 +19636,7 @@
                 <a:spcPts val="1755"/>
               </a:lnSpc>
             </a:pPr>
-            <a:endParaRPr lang="sv-SE" sz="1600" b="0" strike="noStrike" spc="-1">
+            <a:endParaRPr lang="sv-SE" sz="1600" b="0" strike="noStrike" spc="-1" dirty="0">
               <a:latin typeface="Arial"/>
             </a:endParaRPr>
           </a:p>
@@ -18948,16 +19653,95 @@
               <a:buChar char=""/>
             </a:pPr>
             <a:r>
-              <a:rPr lang="sv-SE" sz="1600" b="0" strike="noStrike" spc="-1">
+              <a:rPr lang="sv-SE" sz="1600" b="0" strike="noStrike" spc="-1" dirty="0">
                 <a:solidFill>
                   <a:srgbClr val="000000"/>
                 </a:solidFill>
                 <a:latin typeface="Tahoma"/>
                 <a:ea typeface="DejaVu Sans"/>
               </a:rPr>
-              <a:t> Clay institutet ger $1.000.000 till den som kan  </a:t>
-            </a:r>
-            <a:endParaRPr lang="sv-SE" sz="1600" b="0" strike="noStrike" spc="-1">
+              <a:t> </a:t>
+            </a:r>
+            <a:r>
+              <a:rPr lang="sv-SE" sz="1600" b="0" strike="noStrike" spc="-1" dirty="0" err="1">
+                <a:solidFill>
+                  <a:srgbClr val="000000"/>
+                </a:solidFill>
+                <a:latin typeface="Tahoma"/>
+                <a:ea typeface="DejaVu Sans"/>
+              </a:rPr>
+              <a:t>Clay</a:t>
+            </a:r>
+            <a:r>
+              <a:rPr lang="sv-SE" sz="1600" b="0" strike="noStrike" spc="-1" dirty="0">
+                <a:solidFill>
+                  <a:srgbClr val="000000"/>
+                </a:solidFill>
+                <a:latin typeface="Tahoma"/>
+                <a:ea typeface="DejaVu Sans"/>
+              </a:rPr>
+              <a:t> institutet ger $1.000.000 till den som </a:t>
+            </a:r>
+            <a:r>
+              <a:rPr lang="sv-SE" sz="1600" b="0" strike="noStrike" spc="-1" dirty="0" smtClean="0">
+                <a:solidFill>
+                  <a:srgbClr val="000000"/>
+                </a:solidFill>
+                <a:latin typeface="Tahoma"/>
+                <a:ea typeface="DejaVu Sans"/>
+              </a:rPr>
+              <a:t>kan</a:t>
+            </a:r>
+            <a:br>
+              <a:rPr lang="sv-SE" sz="1600" b="0" strike="noStrike" spc="-1" dirty="0" smtClean="0">
+                <a:solidFill>
+                  <a:srgbClr val="000000"/>
+                </a:solidFill>
+                <a:latin typeface="Tahoma"/>
+                <a:ea typeface="DejaVu Sans"/>
+              </a:rPr>
+            </a:br>
+            <a:r>
+              <a:rPr lang="sv-SE" sz="1600" b="0" strike="noStrike" spc="-1" dirty="0" smtClean="0">
+                <a:solidFill>
+                  <a:srgbClr val="000000"/>
+                </a:solidFill>
+                <a:latin typeface="Tahoma"/>
+                <a:ea typeface="DejaVu Sans"/>
+              </a:rPr>
+              <a:t>    göra </a:t>
+            </a:r>
+            <a:r>
+              <a:rPr lang="sv-SE" sz="1600" b="0" strike="noStrike" spc="-1" dirty="0">
+                <a:solidFill>
+                  <a:srgbClr val="000000"/>
+                </a:solidFill>
+                <a:latin typeface="Tahoma"/>
+                <a:ea typeface="DejaVu Sans"/>
+              </a:rPr>
+              <a:t>dagens långsamma algoritmer snabba</a:t>
+            </a:r>
+            <a:endParaRPr lang="sv-SE" sz="1600" b="0" strike="noStrike" spc="-1" dirty="0">
+              <a:latin typeface="Arial"/>
+            </a:endParaRPr>
+          </a:p>
+          <a:p>
+            <a:pPr>
+              <a:lnSpc>
+                <a:spcPts val="1755"/>
+              </a:lnSpc>
+            </a:pPr>
+            <a:endParaRPr lang="sv-SE" sz="1600" b="0" strike="noStrike" spc="-1" dirty="0">
+              <a:latin typeface="Arial"/>
+            </a:endParaRPr>
+          </a:p>
+          <a:p>
+            <a:pPr>
+              <a:lnSpc>
+                <a:spcPts val="1755"/>
+              </a:lnSpc>
+            </a:pPr>
+            <a:endParaRPr lang="sv-SE" sz="1600" b="0" strike="noStrike" spc="-1" dirty="0">
               <a:latin typeface="Arial"/>
             </a:endParaRPr>
           </a:p>
@@ -18974,16 +19758,43 @@
               <a:buChar char=""/>
             </a:pPr>
             <a:r>
-              <a:rPr lang="sv-SE" sz="1600" b="0" strike="noStrike" spc="-1">
+              <a:rPr lang="sv-SE" sz="1600" b="0" strike="noStrike" spc="-1" dirty="0">
                 <a:solidFill>
                   <a:srgbClr val="000000"/>
                 </a:solidFill>
                 <a:latin typeface="Tahoma"/>
                 <a:ea typeface="DejaVu Sans"/>
               </a:rPr>
-              <a:t> göra dagens långsamma algoritmer snabba</a:t>
-            </a:r>
-            <a:endParaRPr lang="sv-SE" sz="1600" b="0" strike="noStrike" spc="-1">
+              <a:t> Traditionella algoritmer vs. moderna algoritmer</a:t>
+            </a:r>
+            <a:r>
+              <a:rPr dirty="0"/>
+              <a:t/>
+            </a:r>
+            <a:br>
+              <a:rPr dirty="0"/>
+            </a:br>
+            <a:r>
+              <a:rPr lang="sv-SE" sz="1800" b="0" strike="noStrike" spc="-1" dirty="0">
+                <a:solidFill>
+                  <a:srgbClr val="000000"/>
+                </a:solidFill>
+                <a:latin typeface="Arial"/>
+                <a:ea typeface="DejaVu Sans"/>
+              </a:rPr>
+              <a:t>  </a:t>
+            </a:r>
+            <a:r>
+              <a:rPr lang="sv-SE" sz="1600" b="0" strike="noStrike" spc="-1" dirty="0">
+                <a:solidFill>
+                  <a:srgbClr val="000000"/>
+                </a:solidFill>
+                <a:latin typeface="Tahoma"/>
+                <a:ea typeface="DejaVu Sans"/>
+              </a:rPr>
+              <a:t>(matte, programmering vs. Facebook, Youtube)</a:t>
+            </a:r>
+            <a:endParaRPr lang="sv-SE" sz="1600" b="0" strike="noStrike" spc="-1" dirty="0">
               <a:latin typeface="Arial"/>
             </a:endParaRPr>
           </a:p>
@@ -18993,7 +19804,7 @@
                 <a:spcPts val="1755"/>
               </a:lnSpc>
             </a:pPr>
-            <a:endParaRPr lang="sv-SE" sz="1600" b="0" strike="noStrike" spc="-1">
+            <a:endParaRPr lang="sv-SE" sz="1600" b="0" strike="noStrike" spc="-1" dirty="0">
               <a:latin typeface="Arial"/>
             </a:endParaRPr>
           </a:p>
@@ -19003,7 +19814,7 @@
                 <a:spcPts val="1755"/>
               </a:lnSpc>
             </a:pPr>
-            <a:endParaRPr lang="sv-SE" sz="1600" b="0" strike="noStrike" spc="-1">
+            <a:endParaRPr lang="sv-SE" sz="1600" b="0" strike="noStrike" spc="-1" dirty="0">
               <a:latin typeface="Arial"/>
             </a:endParaRPr>
           </a:p>
@@ -19020,77 +19831,7 @@
               <a:buChar char=""/>
             </a:pPr>
             <a:r>
-              <a:rPr lang="sv-SE" sz="1600" b="0" strike="noStrike" spc="-1">
-                <a:solidFill>
-                  <a:srgbClr val="000000"/>
-                </a:solidFill>
-                <a:latin typeface="Tahoma"/>
-                <a:ea typeface="DejaVu Sans"/>
-              </a:rPr>
-              <a:t> Traditionella algoritmer vs. moderna algoritmer</a:t>
-            </a:r>
-            <a:r>
-              <a:t/>
-            </a:r>
-            <a:br/>
-            <a:r>
-              <a:rPr lang="sv-SE" sz="1800" b="0" strike="noStrike" spc="-1">
-                <a:solidFill>
-                  <a:srgbClr val="000000"/>
-                </a:solidFill>
-                <a:latin typeface="Arial"/>
-                <a:ea typeface="DejaVu Sans"/>
-              </a:rPr>
-              <a:t>  </a:t>
-            </a:r>
-            <a:r>
-              <a:rPr lang="sv-SE" sz="1600" b="0" strike="noStrike" spc="-1">
-                <a:solidFill>
-                  <a:srgbClr val="000000"/>
-                </a:solidFill>
-                <a:latin typeface="Tahoma"/>
-                <a:ea typeface="DejaVu Sans"/>
-              </a:rPr>
-              <a:t>(matte, programmering vs. Facebook, Youtube)</a:t>
-            </a:r>
-            <a:endParaRPr lang="sv-SE" sz="1600" b="0" strike="noStrike" spc="-1">
-              <a:latin typeface="Arial"/>
-            </a:endParaRPr>
-          </a:p>
-          <a:p>
-            <a:pPr>
-              <a:lnSpc>
-                <a:spcPts val="1755"/>
-              </a:lnSpc>
-            </a:pPr>
-            <a:endParaRPr lang="sv-SE" sz="1600" b="0" strike="noStrike" spc="-1">
-              <a:latin typeface="Arial"/>
-            </a:endParaRPr>
-          </a:p>
-          <a:p>
-            <a:pPr>
-              <a:lnSpc>
-                <a:spcPts val="1755"/>
-              </a:lnSpc>
-            </a:pPr>
-            <a:endParaRPr lang="sv-SE" sz="1600" b="0" strike="noStrike" spc="-1">
-              <a:latin typeface="Arial"/>
-            </a:endParaRPr>
-          </a:p>
-          <a:p>
-            <a:pPr marL="12600" indent="-215280">
-              <a:lnSpc>
-                <a:spcPts val="1755"/>
-              </a:lnSpc>
-              <a:buClr>
-                <a:srgbClr val="000000"/>
-              </a:buClr>
-              <a:buSzPct val="45000"/>
-              <a:buFont typeface="Wingdings" charset="2"/>
-              <a:buChar char=""/>
-            </a:pPr>
-            <a:r>
-              <a:rPr lang="sv-SE" sz="1600" b="0" strike="noStrike" spc="-1">
+              <a:rPr lang="sv-SE" sz="1600" b="0" strike="noStrike" spc="-1" dirty="0">
                 <a:solidFill>
                   <a:srgbClr val="000000"/>
                 </a:solidFill>
@@ -19099,7 +19840,7 @@
               </a:rPr>
               <a:t> Datainsamling och anonymitet (GDPR)</a:t>
             </a:r>
-            <a:endParaRPr lang="sv-SE" sz="1600" b="0" strike="noStrike" spc="-1">
+            <a:endParaRPr lang="sv-SE" sz="1600" b="0" strike="noStrike" spc="-1" dirty="0">
               <a:latin typeface="Arial"/>
             </a:endParaRPr>
           </a:p>
@@ -19820,7 +20561,7 @@
         </p:nvSpPr>
         <p:spPr>
           <a:xfrm>
-            <a:off x="720" y="1270440"/>
+            <a:off x="-23344" y="1270440"/>
             <a:ext cx="9142200" cy="5621760"/>
           </a:xfrm>
           <a:custGeom>
@@ -20099,7 +20840,7 @@
               </a:lnSpc>
             </a:pPr>
             <a:r>
-              <a:rPr lang="sv-SE" sz="1600" b="1" strike="noStrike" spc="-1">
+              <a:rPr lang="sv-SE" sz="1600" b="1" strike="noStrike" spc="-1" dirty="0">
                 <a:solidFill>
                   <a:srgbClr val="000000"/>
                 </a:solidFill>
@@ -20108,7 +20849,7 @@
               </a:rPr>
               <a:t>Dagens lärdomar</a:t>
             </a:r>
-            <a:endParaRPr lang="sv-SE" sz="1600" b="0" strike="noStrike" spc="-1">
+            <a:endParaRPr lang="sv-SE" sz="1600" b="0" strike="noStrike" spc="-1" dirty="0">
               <a:latin typeface="Arial"/>
             </a:endParaRPr>
           </a:p>

</xml_diff>